<commit_message>
Ajustes nos arquivos do repositório (2)
</commit_message>
<xml_diff>
--- a/slides-aulas/ambiente-exec-e-geracao-codigo.pptx
+++ b/slides-aulas/ambiente-exec-e-geracao-codigo.pptx
@@ -257,7 +257,7 @@
           <a:p>
             <a:fld id="{7A07F658-AE08-4AEE-A57F-CB2B7F06D381}" type="datetimeFigureOut">
               <a:rPr lang="en-US" smtClean="0"/>
-              <a:t>10-Nov-16</a:t>
+              <a:t>19-Jun-17</a:t>
             </a:fld>
             <a:endParaRPr lang="en-US"/>
           </a:p>
@@ -1329,7 +1329,7 @@
           <a:p>
             <a:fld id="{9965D083-53B3-4835-AC18-05B6039641BC}" type="datetimeFigureOut">
               <a:rPr lang="en-US" smtClean="0"/>
-              <a:t>10-Nov-16</a:t>
+              <a:t>19-Jun-17</a:t>
             </a:fld>
             <a:endParaRPr lang="en-US"/>
           </a:p>
@@ -1499,7 +1499,7 @@
           <a:p>
             <a:fld id="{9965D083-53B3-4835-AC18-05B6039641BC}" type="datetimeFigureOut">
               <a:rPr lang="en-US" smtClean="0"/>
-              <a:t>10-Nov-16</a:t>
+              <a:t>19-Jun-17</a:t>
             </a:fld>
             <a:endParaRPr lang="en-US"/>
           </a:p>
@@ -1679,7 +1679,7 @@
           <a:p>
             <a:fld id="{9965D083-53B3-4835-AC18-05B6039641BC}" type="datetimeFigureOut">
               <a:rPr lang="en-US" smtClean="0"/>
-              <a:t>10-Nov-16</a:t>
+              <a:t>19-Jun-17</a:t>
             </a:fld>
             <a:endParaRPr lang="en-US"/>
           </a:p>
@@ -2175,7 +2175,7 @@
           <a:p>
             <a:fld id="{9965D083-53B3-4835-AC18-05B6039641BC}" type="datetimeFigureOut">
               <a:rPr lang="en-US" smtClean="0"/>
-              <a:t>10-Nov-16</a:t>
+              <a:t>19-Jun-17</a:t>
             </a:fld>
             <a:endParaRPr lang="en-US"/>
           </a:p>
@@ -2421,7 +2421,7 @@
           <a:p>
             <a:fld id="{9965D083-53B3-4835-AC18-05B6039641BC}" type="datetimeFigureOut">
               <a:rPr lang="en-US" smtClean="0"/>
-              <a:t>10-Nov-16</a:t>
+              <a:t>19-Jun-17</a:t>
             </a:fld>
             <a:endParaRPr lang="en-US"/>
           </a:p>
@@ -2709,7 +2709,7 @@
           <a:p>
             <a:fld id="{9965D083-53B3-4835-AC18-05B6039641BC}" type="datetimeFigureOut">
               <a:rPr lang="en-US" smtClean="0"/>
-              <a:t>10-Nov-16</a:t>
+              <a:t>19-Jun-17</a:t>
             </a:fld>
             <a:endParaRPr lang="en-US"/>
           </a:p>
@@ -3131,7 +3131,7 @@
           <a:p>
             <a:fld id="{9965D083-53B3-4835-AC18-05B6039641BC}" type="datetimeFigureOut">
               <a:rPr lang="en-US" smtClean="0"/>
-              <a:t>10-Nov-16</a:t>
+              <a:t>19-Jun-17</a:t>
             </a:fld>
             <a:endParaRPr lang="en-US"/>
           </a:p>
@@ -3249,7 +3249,7 @@
           <a:p>
             <a:fld id="{9965D083-53B3-4835-AC18-05B6039641BC}" type="datetimeFigureOut">
               <a:rPr lang="en-US" smtClean="0"/>
-              <a:t>10-Nov-16</a:t>
+              <a:t>19-Jun-17</a:t>
             </a:fld>
             <a:endParaRPr lang="en-US"/>
           </a:p>
@@ -3344,7 +3344,7 @@
           <a:p>
             <a:fld id="{9965D083-53B3-4835-AC18-05B6039641BC}" type="datetimeFigureOut">
               <a:rPr lang="en-US" smtClean="0"/>
-              <a:t>10-Nov-16</a:t>
+              <a:t>19-Jun-17</a:t>
             </a:fld>
             <a:endParaRPr lang="en-US"/>
           </a:p>
@@ -3621,7 +3621,7 @@
           <a:p>
             <a:fld id="{9965D083-53B3-4835-AC18-05B6039641BC}" type="datetimeFigureOut">
               <a:rPr lang="en-US" smtClean="0"/>
-              <a:t>10-Nov-16</a:t>
+              <a:t>19-Jun-17</a:t>
             </a:fld>
             <a:endParaRPr lang="en-US"/>
           </a:p>
@@ -3874,7 +3874,7 @@
           <a:p>
             <a:fld id="{9965D083-53B3-4835-AC18-05B6039641BC}" type="datetimeFigureOut">
               <a:rPr lang="en-US" smtClean="0"/>
-              <a:t>10-Nov-16</a:t>
+              <a:t>19-Jun-17</a:t>
             </a:fld>
             <a:endParaRPr lang="en-US"/>
           </a:p>
@@ -4087,7 +4087,7 @@
           <a:p>
             <a:fld id="{9965D083-53B3-4835-AC18-05B6039641BC}" type="datetimeFigureOut">
               <a:rPr lang="en-US" smtClean="0"/>
-              <a:t>10-Nov-16</a:t>
+              <a:t>19-Jun-17</a:t>
             </a:fld>
             <a:endParaRPr lang="en-US"/>
           </a:p>
@@ -4600,11 +4600,7 @@
             <a:pPr lvl="2"/>
             <a:r>
               <a:rPr lang="pt-BR" dirty="0" smtClean="0"/>
-              <a:t>Criada pelo chamador da </a:t>
-            </a:r>
-            <a:r>
-              <a:rPr lang="pt-BR" dirty="0" smtClean="0"/>
-              <a:t>função</a:t>
+              <a:t>Criada pelo chamador da função</a:t>
             </a:r>
           </a:p>
           <a:p>
@@ -4628,7 +4624,6 @@
               <a:rPr lang="pt-BR" dirty="0" smtClean="0"/>
               <a:t>Função chamada retorna para aquele endereço</a:t>
             </a:r>
-            <a:endParaRPr lang="pt-BR" dirty="0" smtClean="0"/>
           </a:p>
           <a:p>
             <a:pPr lvl="1"/>
@@ -4748,7 +4743,7 @@
           </a:ln>
           <a:extLst>
             <a:ext uri="{C572A759-6A51-4108-AA02-DFA0A04FC94B}">
-              <ma14:wrappingTextBoxFlag xmlns:ma14="http://schemas.microsoft.com/office/mac/drawingml/2011/main" xmlns="" val="1"/>
+              <ma14:wrappingTextBoxFlag xmlns="" xmlns:ma14="http://schemas.microsoft.com/office/mac/drawingml/2011/main" val="1"/>
             </a:ext>
           </a:extLst>
         </p:spPr>
@@ -4948,7 +4943,7 @@
           </a:ln>
           <a:extLst>
             <a:ext uri="{C572A759-6A51-4108-AA02-DFA0A04FC94B}">
-              <ma14:wrappingTextBoxFlag xmlns:ma14="http://schemas.microsoft.com/office/mac/drawingml/2011/main" xmlns="" val="1"/>
+              <ma14:wrappingTextBoxFlag xmlns="" xmlns:ma14="http://schemas.microsoft.com/office/mac/drawingml/2011/main" val="1"/>
             </a:ext>
           </a:extLst>
         </p:spPr>
@@ -5097,7 +5092,7 @@
           </a:ln>
           <a:extLst>
             <a:ext uri="{C572A759-6A51-4108-AA02-DFA0A04FC94B}">
-              <ma14:wrappingTextBoxFlag xmlns:ma14="http://schemas.microsoft.com/office/mac/drawingml/2011/main" xmlns="" val="1"/>
+              <ma14:wrappingTextBoxFlag xmlns="" xmlns:ma14="http://schemas.microsoft.com/office/mac/drawingml/2011/main" val="1"/>
             </a:ext>
           </a:extLst>
         </p:spPr>
@@ -5246,7 +5241,7 @@
           </a:ln>
           <a:extLst>
             <a:ext uri="{C572A759-6A51-4108-AA02-DFA0A04FC94B}">
-              <ma14:wrappingTextBoxFlag xmlns:ma14="http://schemas.microsoft.com/office/mac/drawingml/2011/main" xmlns="" val="1"/>
+              <ma14:wrappingTextBoxFlag xmlns="" xmlns:ma14="http://schemas.microsoft.com/office/mac/drawingml/2011/main" val="1"/>
             </a:ext>
           </a:extLst>
         </p:spPr>
@@ -5395,7 +5390,7 @@
           </a:ln>
           <a:extLst>
             <a:ext uri="{C572A759-6A51-4108-AA02-DFA0A04FC94B}">
-              <ma14:wrappingTextBoxFlag xmlns:ma14="http://schemas.microsoft.com/office/mac/drawingml/2011/main" xmlns="" val="1"/>
+              <ma14:wrappingTextBoxFlag xmlns="" xmlns:ma14="http://schemas.microsoft.com/office/mac/drawingml/2011/main" val="1"/>
             </a:ext>
           </a:extLst>
         </p:spPr>
@@ -5544,7 +5539,7 @@
           </a:ln>
           <a:extLst>
             <a:ext uri="{C572A759-6A51-4108-AA02-DFA0A04FC94B}">
-              <ma14:wrappingTextBoxFlag xmlns:ma14="http://schemas.microsoft.com/office/mac/drawingml/2011/main" xmlns="" val="1"/>
+              <ma14:wrappingTextBoxFlag xmlns="" xmlns:ma14="http://schemas.microsoft.com/office/mac/drawingml/2011/main" val="1"/>
             </a:ext>
           </a:extLst>
         </p:spPr>
@@ -15005,6 +15000,13 @@
   <p:clrMapOvr>
     <a:masterClrMapping/>
   </p:clrMapOvr>
+  <p:timing>
+    <p:tnLst>
+      <p:par>
+        <p:cTn id="1" dur="indefinite" restart="never" nodeType="tmRoot"/>
+      </p:par>
+    </p:tnLst>
+  </p:timing>
 </p:sld>
 </file>
 
@@ -25022,8 +25024,9 @@
             </a:r>
             <a:r>
               <a:rPr lang="pt-BR" dirty="0" smtClean="0"/>
-              <a:t>=10, </a:t>
-            </a:r>
+              <a:t>=5, </a:t>
+            </a:r>
+            <a:endParaRPr lang="pt-BR" dirty="0" smtClean="0"/>
           </a:p>
           <a:p>
             <a:pPr algn="ctr"/>
@@ -25938,7 +25941,6 @@
               <a:rPr lang="en-US" dirty="0" smtClean="0"/>
               <a:t> interface com SO</a:t>
             </a:r>
-            <a:endParaRPr lang="en-US" dirty="0" smtClean="0"/>
           </a:p>
         </p:txBody>
       </p:sp>
@@ -26402,8 +26404,9 @@
             </a:r>
             <a:r>
               <a:rPr lang="pt-BR" dirty="0" smtClean="0"/>
-              <a:t>=10, </a:t>
-            </a:r>
+              <a:t>=5, </a:t>
+            </a:r>
+            <a:endParaRPr lang="pt-BR" dirty="0" smtClean="0"/>
           </a:p>
           <a:p>
             <a:pPr algn="ctr"/>
@@ -42909,27 +42912,13 @@
                 <a:latin typeface="Courier New" pitchFamily="49" charset="0"/>
                 <a:cs typeface="Courier New" pitchFamily="49" charset="0"/>
               </a:rPr>
-              <a:t> c = </a:t>
+              <a:t> c = new </a:t>
             </a:r>
             <a:r>
               <a:rPr lang="pt-BR" sz="1600" b="1" dirty="0" err="1" smtClean="0">
                 <a:latin typeface="Courier New" pitchFamily="49" charset="0"/>
                 <a:cs typeface="Courier New" pitchFamily="49" charset="0"/>
               </a:rPr>
-              <a:t>new</a:t>
-            </a:r>
-            <a:r>
-              <a:rPr lang="pt-BR" sz="1600" b="1" dirty="0" smtClean="0">
-                <a:latin typeface="Courier New" pitchFamily="49" charset="0"/>
-                <a:cs typeface="Courier New" pitchFamily="49" charset="0"/>
-              </a:rPr>
-              <a:t> </a:t>
-            </a:r>
-            <a:r>
-              <a:rPr lang="pt-BR" sz="1600" b="1" dirty="0" err="1" smtClean="0">
-                <a:latin typeface="Courier New" pitchFamily="49" charset="0"/>
-                <a:cs typeface="Courier New" pitchFamily="49" charset="0"/>
-              </a:rPr>
               <a:t>Circle</a:t>
             </a:r>
             <a:r>
@@ -42937,21 +42926,27 @@
                 <a:latin typeface="Courier New" pitchFamily="49" charset="0"/>
                 <a:cs typeface="Courier New" pitchFamily="49" charset="0"/>
               </a:rPr>
-              <a:t>(0,12,4); Box b = </a:t>
-            </a:r>
-            <a:r>
-              <a:rPr lang="pt-BR" sz="1600" b="1" dirty="0" err="1" smtClean="0">
-                <a:latin typeface="Courier New" pitchFamily="49" charset="0"/>
-                <a:cs typeface="Courier New" pitchFamily="49" charset="0"/>
-              </a:rPr>
-              <a:t>new</a:t>
-            </a:r>
-            <a:r>
-              <a:rPr lang="pt-BR" sz="1600" b="1" dirty="0" smtClean="0">
-                <a:latin typeface="Courier New" pitchFamily="49" charset="0"/>
-                <a:cs typeface="Courier New" pitchFamily="49" charset="0"/>
-              </a:rPr>
-              <a:t> Box(0,4,8,8);</a:t>
+              <a:t>(0,12,4); </a:t>
+            </a:r>
+            <a:endParaRPr lang="pt-BR" sz="1600" b="1" dirty="0" smtClean="0">
+              <a:latin typeface="Courier New" pitchFamily="49" charset="0"/>
+              <a:cs typeface="Courier New" pitchFamily="49" charset="0"/>
+            </a:endParaRPr>
+          </a:p>
+          <a:p>
+            <a:r>
+              <a:rPr lang="pt-BR" sz="1600" b="1" dirty="0" smtClean="0">
+                <a:latin typeface="Courier New" pitchFamily="49" charset="0"/>
+                <a:cs typeface="Courier New" pitchFamily="49" charset="0"/>
+              </a:rPr>
+              <a:t>Box </a:t>
+            </a:r>
+            <a:r>
+              <a:rPr lang="pt-BR" sz="1600" b="1" dirty="0" smtClean="0">
+                <a:latin typeface="Courier New" pitchFamily="49" charset="0"/>
+                <a:cs typeface="Courier New" pitchFamily="49" charset="0"/>
+              </a:rPr>
+              <a:t>b = new Box(0,4,8,8);</a:t>
             </a:r>
           </a:p>
         </p:txBody>
@@ -47295,7 +47290,6 @@
               <a:rPr lang="pt-BR" dirty="0" smtClean="0"/>
               <a:t>Exemplos: </a:t>
             </a:r>
-            <a:endParaRPr lang="pt-BR" dirty="0" smtClean="0"/>
           </a:p>
           <a:p>
             <a:pPr lvl="1"/>
@@ -49597,15 +49591,7 @@
           <a:p>
             <a:r>
               <a:rPr lang="pt-BR" dirty="0" smtClean="0"/>
-              <a:t>Exemplo: </a:t>
-            </a:r>
-            <a:r>
-              <a:rPr lang="pt-BR" dirty="0" smtClean="0"/>
-              <a:t>MSIL </a:t>
-            </a:r>
-            <a:r>
-              <a:rPr lang="pt-BR" dirty="0" smtClean="0"/>
-              <a:t>(1/3)</a:t>
+              <a:t>Exemplo: MSIL (1/3)</a:t>
             </a:r>
             <a:endParaRPr lang="pt-BR" dirty="0"/>
           </a:p>
@@ -50115,15 +50101,7 @@
           <a:p>
             <a:r>
               <a:rPr lang="pt-BR" dirty="0" smtClean="0"/>
-              <a:t>Exemplo: </a:t>
-            </a:r>
-            <a:r>
-              <a:rPr lang="pt-BR" dirty="0" smtClean="0"/>
-              <a:t>MSIL (2/3</a:t>
-            </a:r>
-            <a:r>
-              <a:rPr lang="pt-BR" dirty="0" smtClean="0"/>
-              <a:t>)</a:t>
+              <a:t>Exemplo: MSIL (2/3)</a:t>
             </a:r>
             <a:endParaRPr lang="pt-BR" dirty="0"/>
           </a:p>
@@ -50782,15 +50760,7 @@
           <a:p>
             <a:r>
               <a:rPr lang="pt-BR" dirty="0" smtClean="0"/>
-              <a:t>Exemplo: </a:t>
-            </a:r>
-            <a:r>
-              <a:rPr lang="pt-BR" dirty="0" smtClean="0"/>
-              <a:t>MSIL (3/3</a:t>
-            </a:r>
-            <a:r>
-              <a:rPr lang="pt-BR" dirty="0" smtClean="0"/>
-              <a:t>)</a:t>
+              <a:t>Exemplo: MSIL (3/3)</a:t>
             </a:r>
             <a:endParaRPr lang="pt-BR" dirty="0"/>
           </a:p>
@@ -51363,6 +51333,13 @@
   <p:clrMapOvr>
     <a:masterClrMapping/>
   </p:clrMapOvr>
+  <p:timing>
+    <p:tnLst>
+      <p:par>
+        <p:cTn id="1" dur="indefinite" restart="never" nodeType="tmRoot"/>
+      </p:par>
+    </p:tnLst>
+  </p:timing>
 </p:sld>
 </file>
 
@@ -52623,21 +52600,12 @@
               <a:rPr lang="pt-BR" dirty="0" smtClean="0"/>
               <a:t>Variáveis globais</a:t>
             </a:r>
-            <a:endParaRPr lang="pt-BR" dirty="0" smtClean="0"/>
           </a:p>
           <a:p>
             <a:pPr lvl="1"/>
             <a:r>
               <a:rPr lang="pt-BR" dirty="0" smtClean="0"/>
-              <a:t>Estrutura </a:t>
-            </a:r>
-            <a:r>
-              <a:rPr lang="pt-BR" dirty="0" smtClean="0"/>
-              <a:t>de </a:t>
-            </a:r>
-            <a:r>
-              <a:rPr lang="pt-BR" dirty="0" smtClean="0"/>
-              <a:t>dados</a:t>
+              <a:t>Estrutura de dados</a:t>
             </a:r>
           </a:p>
           <a:p>
@@ -52646,7 +52614,6 @@
               <a:rPr lang="pt-BR" dirty="0" smtClean="0"/>
               <a:t>Funções estáticas</a:t>
             </a:r>
-            <a:endParaRPr lang="pt-BR" dirty="0" smtClean="0"/>
           </a:p>
           <a:p>
             <a:endParaRPr lang="pt-BR" dirty="0"/>

</xml_diff>